<commit_message>
BPM working before cleanup ... need to make graphics with confirm button. we'll output the metronome as well once we merge sound with the lcd
</commit_message>
<xml_diff>
--- a/Menus/LCD_Menu_Slides.pptx
+++ b/Menus/LCD_Menu_Slides.pptx
@@ -2,10 +2,14 @@
 <file path=ppt/presentation.xml><?xml version="1.0" encoding="utf-8"?>
 <p:presentation xmlns:a="http://schemas.openxmlformats.org/drawingml/2006/main" xmlns:r="http://schemas.openxmlformats.org/officeDocument/2006/relationships" xmlns:p="http://schemas.openxmlformats.org/presentationml/2006/main" saveSubsetFonts="1" autoCompressPictures="0">
   <p:sldMasterIdLst>
-    <p:sldMasterId id="2147483972" r:id="rId1"/>
+    <p:sldMasterId id="2147484308" r:id="rId1"/>
   </p:sldMasterIdLst>
+  <p:notesMasterIdLst>
+    <p:notesMasterId r:id="rId4"/>
+  </p:notesMasterIdLst>
   <p:sldIdLst>
     <p:sldId id="256" r:id="rId2"/>
+    <p:sldId id="257" r:id="rId3"/>
   </p:sldIdLst>
   <p:sldSz cx="2286000" cy="1527175"/>
   <p:notesSz cx="6858000" cy="9144000"/>
@@ -107,18 +111,13 @@
 </p:presentation>
 </file>
 
-<file path=ppt/slideLayouts/slideLayout1.xml><?xml version="1.0" encoding="utf-8"?>
-<p:sldLayout xmlns:a="http://schemas.openxmlformats.org/drawingml/2006/main" xmlns:r="http://schemas.openxmlformats.org/officeDocument/2006/relationships" xmlns:p="http://schemas.openxmlformats.org/presentationml/2006/main" showMasterSp="0" type="title" preserve="1">
-  <p:cSld name="Title Slide">
+<file path=ppt/notesMasters/notesMaster1.xml><?xml version="1.0" encoding="utf-8"?>
+<p:notesMaster xmlns:a="http://schemas.openxmlformats.org/drawingml/2006/main" xmlns:r="http://schemas.openxmlformats.org/officeDocument/2006/relationships" xmlns:p="http://schemas.openxmlformats.org/presentationml/2006/main">
+  <p:cSld>
     <p:bg>
-      <p:bgPr>
-        <a:solidFill>
-          <a:schemeClr val="bg2">
-            <a:lumMod val="75000"/>
-          </a:schemeClr>
-        </a:solidFill>
-        <a:effectLst/>
-      </p:bgPr>
+      <p:bgRef idx="1001">
+        <a:schemeClr val="bg1"/>
+      </p:bgRef>
     </p:bg>
     <p:spTree>
       <p:nvGrpSpPr>
@@ -136,134 +135,365 @@
       </p:grpSpPr>
       <p:sp>
         <p:nvSpPr>
-          <p:cNvPr id="2" name="Title 1"/>
-          <p:cNvSpPr>
-            <a:spLocks noGrp="1"/>
-          </p:cNvSpPr>
-          <p:nvPr>
-            <p:ph type="ctrTitle"/>
-          </p:nvPr>
-        </p:nvSpPr>
-        <p:spPr>
-          <a:xfrm>
-            <a:off x="236601" y="169007"/>
-            <a:ext cx="1765935" cy="900015"/>
-          </a:xfrm>
-        </p:spPr>
-        <p:txBody>
-          <a:bodyPr anchor="b">
-            <a:normAutofit/>
-          </a:bodyPr>
-          <a:lstStyle>
-            <a:lvl1pPr algn="l">
-              <a:lnSpc>
-                <a:spcPct val="85000"/>
-              </a:lnSpc>
-              <a:defRPr sz="1470" baseline="0">
-                <a:solidFill>
-                  <a:schemeClr val="tx1"/>
-                </a:solidFill>
-              </a:defRPr>
-            </a:lvl1pPr>
-          </a:lstStyle>
-          <a:p>
-            <a:r>
-              <a:rPr lang="en-US" smtClean="0"/>
-              <a:t>Click to edit Master title style</a:t>
-            </a:r>
-            <a:endParaRPr lang="en-US" dirty="0"/>
-          </a:p>
-        </p:txBody>
-      </p:sp>
-      <p:sp>
-        <p:nvSpPr>
-          <p:cNvPr id="3" name="Subtitle 2"/>
-          <p:cNvSpPr>
-            <a:spLocks noGrp="1"/>
-          </p:cNvSpPr>
-          <p:nvPr>
-            <p:ph type="subTitle" idx="1"/>
-          </p:nvPr>
-        </p:nvSpPr>
-        <p:spPr>
-          <a:xfrm>
-            <a:off x="236601" y="1069023"/>
-            <a:ext cx="1765935" cy="376703"/>
-          </a:xfrm>
-        </p:spPr>
-        <p:txBody>
-          <a:bodyPr>
-            <a:normAutofit/>
-          </a:bodyPr>
-          <a:lstStyle>
-            <a:lvl1pPr marL="0" indent="0" algn="l">
-              <a:buNone/>
-              <a:defRPr sz="445" baseline="0">
-                <a:solidFill>
-                  <a:schemeClr val="tx1">
-                    <a:lumMod val="85000"/>
-                  </a:schemeClr>
-                </a:solidFill>
-              </a:defRPr>
-            </a:lvl1pPr>
-            <a:lvl2pPr marL="101818" indent="0" algn="ctr">
-              <a:buNone/>
-              <a:defRPr sz="445"/>
-            </a:lvl2pPr>
-            <a:lvl3pPr marL="203637" indent="0" algn="ctr">
-              <a:buNone/>
-              <a:defRPr sz="445"/>
-            </a:lvl3pPr>
-            <a:lvl4pPr marL="305455" indent="0" algn="ctr">
-              <a:buNone/>
-              <a:defRPr sz="445"/>
-            </a:lvl4pPr>
-            <a:lvl5pPr marL="407274" indent="0" algn="ctr">
-              <a:buNone/>
-              <a:defRPr sz="445"/>
-            </a:lvl5pPr>
-            <a:lvl6pPr marL="509092" indent="0" algn="ctr">
-              <a:buNone/>
-              <a:defRPr sz="445"/>
-            </a:lvl6pPr>
-            <a:lvl7pPr marL="610911" indent="0" algn="ctr">
-              <a:buNone/>
-              <a:defRPr sz="445"/>
-            </a:lvl7pPr>
-            <a:lvl8pPr marL="712729" indent="0" algn="ctr">
-              <a:buNone/>
-              <a:defRPr sz="445"/>
-            </a:lvl8pPr>
-            <a:lvl9pPr marL="814548" indent="0" algn="ctr">
-              <a:buNone/>
-              <a:defRPr sz="445"/>
-            </a:lvl9pPr>
-          </a:lstStyle>
-          <a:p>
-            <a:r>
-              <a:rPr lang="en-US" smtClean="0"/>
-              <a:t>Click to edit Master subtitle style</a:t>
-            </a:r>
-            <a:endParaRPr lang="en-US" dirty="0"/>
-          </a:p>
-        </p:txBody>
-      </p:sp>
-      <p:sp>
-        <p:nvSpPr>
-          <p:cNvPr id="7" name="Rectangle 6"/>
-          <p:cNvSpPr/>
-          <p:nvPr/>
+          <p:cNvPr id="2" name="Header Placeholder 1"/>
+          <p:cNvSpPr>
+            <a:spLocks noGrp="1"/>
+          </p:cNvSpPr>
+          <p:nvPr>
+            <p:ph type="hdr" sz="quarter"/>
+          </p:nvPr>
         </p:nvSpPr>
         <p:spPr>
           <a:xfrm>
             <a:off x="0" y="0"/>
-            <a:ext cx="85725" cy="1527175"/>
+            <a:ext cx="2971800" cy="458788"/>
+          </a:xfrm>
+          <a:prstGeom prst="rect">
+            <a:avLst/>
+          </a:prstGeom>
+        </p:spPr>
+        <p:txBody>
+          <a:bodyPr vert="horz" lIns="91440" tIns="45720" rIns="91440" bIns="45720" rtlCol="0"/>
+          <a:lstStyle>
+            <a:lvl1pPr algn="l">
+              <a:defRPr sz="1200"/>
+            </a:lvl1pPr>
+          </a:lstStyle>
+          <a:p>
+            <a:endParaRPr lang="en-US"/>
+          </a:p>
+        </p:txBody>
+      </p:sp>
+      <p:sp>
+        <p:nvSpPr>
+          <p:cNvPr id="3" name="Date Placeholder 2"/>
+          <p:cNvSpPr>
+            <a:spLocks noGrp="1"/>
+          </p:cNvSpPr>
+          <p:nvPr>
+            <p:ph type="dt" idx="1"/>
+          </p:nvPr>
+        </p:nvSpPr>
+        <p:spPr>
+          <a:xfrm>
+            <a:off x="3884613" y="0"/>
+            <a:ext cx="2971800" cy="458788"/>
+          </a:xfrm>
+          <a:prstGeom prst="rect">
+            <a:avLst/>
+          </a:prstGeom>
+        </p:spPr>
+        <p:txBody>
+          <a:bodyPr vert="horz" lIns="91440" tIns="45720" rIns="91440" bIns="45720" rtlCol="0"/>
+          <a:lstStyle>
+            <a:lvl1pPr algn="r">
+              <a:defRPr sz="1200"/>
+            </a:lvl1pPr>
+          </a:lstStyle>
+          <a:p>
+            <a:fld id="{D6B35981-36BF-0B48-A09F-23D7D7E119E4}" type="datetimeFigureOut">
+              <a:rPr lang="en-US" smtClean="0"/>
+              <a:t>12/25/17</a:t>
+            </a:fld>
+            <a:endParaRPr lang="en-US"/>
+          </a:p>
+        </p:txBody>
+      </p:sp>
+      <p:sp>
+        <p:nvSpPr>
+          <p:cNvPr id="4" name="Slide Image Placeholder 3"/>
+          <p:cNvSpPr>
+            <a:spLocks noGrp="1" noRot="1" noChangeAspect="1"/>
+          </p:cNvSpPr>
+          <p:nvPr>
+            <p:ph type="sldImg" idx="2"/>
+          </p:nvPr>
+        </p:nvSpPr>
+        <p:spPr>
+          <a:xfrm>
+            <a:off x="1119188" y="1143000"/>
+            <a:ext cx="4619625" cy="3086100"/>
+          </a:xfrm>
+          <a:prstGeom prst="rect">
+            <a:avLst/>
+          </a:prstGeom>
+          <a:noFill/>
+          <a:ln w="12700">
+            <a:solidFill>
+              <a:prstClr val="black"/>
+            </a:solidFill>
+          </a:ln>
+        </p:spPr>
+        <p:txBody>
+          <a:bodyPr vert="horz" lIns="91440" tIns="45720" rIns="91440" bIns="45720" rtlCol="0" anchor="ctr"/>
+          <a:lstStyle/>
+          <a:p>
+            <a:endParaRPr lang="en-US"/>
+          </a:p>
+        </p:txBody>
+      </p:sp>
+      <p:sp>
+        <p:nvSpPr>
+          <p:cNvPr id="5" name="Notes Placeholder 4"/>
+          <p:cNvSpPr>
+            <a:spLocks noGrp="1"/>
+          </p:cNvSpPr>
+          <p:nvPr>
+            <p:ph type="body" sz="quarter" idx="3"/>
+          </p:nvPr>
+        </p:nvSpPr>
+        <p:spPr>
+          <a:xfrm>
+            <a:off x="685800" y="4400550"/>
+            <a:ext cx="5486400" cy="3600450"/>
+          </a:xfrm>
+          <a:prstGeom prst="rect">
+            <a:avLst/>
+          </a:prstGeom>
+        </p:spPr>
+        <p:txBody>
+          <a:bodyPr vert="horz" lIns="91440" tIns="45720" rIns="91440" bIns="45720" rtlCol="0"/>
+          <a:lstStyle/>
+          <a:p>
+            <a:pPr lvl="0"/>
+            <a:r>
+              <a:rPr lang="en-US" smtClean="0"/>
+              <a:t>Click to edit Master text styles</a:t>
+            </a:r>
+          </a:p>
+          <a:p>
+            <a:pPr lvl="1"/>
+            <a:r>
+              <a:rPr lang="en-US" smtClean="0"/>
+              <a:t>Second level</a:t>
+            </a:r>
+          </a:p>
+          <a:p>
+            <a:pPr lvl="2"/>
+            <a:r>
+              <a:rPr lang="en-US" smtClean="0"/>
+              <a:t>Third level</a:t>
+            </a:r>
+          </a:p>
+          <a:p>
+            <a:pPr lvl="3"/>
+            <a:r>
+              <a:rPr lang="en-US" smtClean="0"/>
+              <a:t>Fourth level</a:t>
+            </a:r>
+          </a:p>
+          <a:p>
+            <a:pPr lvl="4"/>
+            <a:r>
+              <a:rPr lang="en-US" smtClean="0"/>
+              <a:t>Fifth level</a:t>
+            </a:r>
+            <a:endParaRPr lang="en-US"/>
+          </a:p>
+        </p:txBody>
+      </p:sp>
+      <p:sp>
+        <p:nvSpPr>
+          <p:cNvPr id="6" name="Footer Placeholder 5"/>
+          <p:cNvSpPr>
+            <a:spLocks noGrp="1"/>
+          </p:cNvSpPr>
+          <p:nvPr>
+            <p:ph type="ftr" sz="quarter" idx="4"/>
+          </p:nvPr>
+        </p:nvSpPr>
+        <p:spPr>
+          <a:xfrm>
+            <a:off x="0" y="8685213"/>
+            <a:ext cx="2971800" cy="458787"/>
+          </a:xfrm>
+          <a:prstGeom prst="rect">
+            <a:avLst/>
+          </a:prstGeom>
+        </p:spPr>
+        <p:txBody>
+          <a:bodyPr vert="horz" lIns="91440" tIns="45720" rIns="91440" bIns="45720" rtlCol="0" anchor="b"/>
+          <a:lstStyle>
+            <a:lvl1pPr algn="l">
+              <a:defRPr sz="1200"/>
+            </a:lvl1pPr>
+          </a:lstStyle>
+          <a:p>
+            <a:endParaRPr lang="en-US"/>
+          </a:p>
+        </p:txBody>
+      </p:sp>
+      <p:sp>
+        <p:nvSpPr>
+          <p:cNvPr id="7" name="Slide Number Placeholder 6"/>
+          <p:cNvSpPr>
+            <a:spLocks noGrp="1"/>
+          </p:cNvSpPr>
+          <p:nvPr>
+            <p:ph type="sldNum" sz="quarter" idx="5"/>
+          </p:nvPr>
+        </p:nvSpPr>
+        <p:spPr>
+          <a:xfrm>
+            <a:off x="3884613" y="8685213"/>
+            <a:ext cx="2971800" cy="458787"/>
+          </a:xfrm>
+          <a:prstGeom prst="rect">
+            <a:avLst/>
+          </a:prstGeom>
+        </p:spPr>
+        <p:txBody>
+          <a:bodyPr vert="horz" lIns="91440" tIns="45720" rIns="91440" bIns="45720" rtlCol="0" anchor="b"/>
+          <a:lstStyle>
+            <a:lvl1pPr algn="r">
+              <a:defRPr sz="1200"/>
+            </a:lvl1pPr>
+          </a:lstStyle>
+          <a:p>
+            <a:fld id="{E13EC4DA-8094-F74A-88B3-9DCE53820377}" type="slidenum">
+              <a:rPr lang="en-US" smtClean="0"/>
+              <a:t>‹#›</a:t>
+            </a:fld>
+            <a:endParaRPr lang="en-US"/>
+          </a:p>
+        </p:txBody>
+      </p:sp>
+    </p:spTree>
+    <p:extLst>
+      <p:ext uri="{BB962C8B-B14F-4D97-AF65-F5344CB8AC3E}">
+        <p14:creationId xmlns:p14="http://schemas.microsoft.com/office/powerpoint/2010/main" val="2073609544"/>
+      </p:ext>
+    </p:extLst>
+  </p:cSld>
+  <p:clrMap bg1="lt1" tx1="dk1" bg2="lt2" tx2="dk2" accent1="accent1" accent2="accent2" accent3="accent3" accent4="accent4" accent5="accent5" accent6="accent6" hlink="hlink" folHlink="folHlink"/>
+  <p:notesStyle>
+    <a:lvl1pPr marL="0" algn="l" defTabSz="181115" rtl="0" eaLnBrk="1" latinLnBrk="0" hangingPunct="1">
+      <a:defRPr sz="238" kern="1200">
+        <a:solidFill>
+          <a:schemeClr val="tx1"/>
+        </a:solidFill>
+        <a:latin typeface="+mn-lt"/>
+        <a:ea typeface="+mn-ea"/>
+        <a:cs typeface="+mn-cs"/>
+      </a:defRPr>
+    </a:lvl1pPr>
+    <a:lvl2pPr marL="90555" algn="l" defTabSz="181115" rtl="0" eaLnBrk="1" latinLnBrk="0" hangingPunct="1">
+      <a:defRPr sz="238" kern="1200">
+        <a:solidFill>
+          <a:schemeClr val="tx1"/>
+        </a:solidFill>
+        <a:latin typeface="+mn-lt"/>
+        <a:ea typeface="+mn-ea"/>
+        <a:cs typeface="+mn-cs"/>
+      </a:defRPr>
+    </a:lvl2pPr>
+    <a:lvl3pPr marL="181115" algn="l" defTabSz="181115" rtl="0" eaLnBrk="1" latinLnBrk="0" hangingPunct="1">
+      <a:defRPr sz="238" kern="1200">
+        <a:solidFill>
+          <a:schemeClr val="tx1"/>
+        </a:solidFill>
+        <a:latin typeface="+mn-lt"/>
+        <a:ea typeface="+mn-ea"/>
+        <a:cs typeface="+mn-cs"/>
+      </a:defRPr>
+    </a:lvl3pPr>
+    <a:lvl4pPr marL="271669" algn="l" defTabSz="181115" rtl="0" eaLnBrk="1" latinLnBrk="0" hangingPunct="1">
+      <a:defRPr sz="238" kern="1200">
+        <a:solidFill>
+          <a:schemeClr val="tx1"/>
+        </a:solidFill>
+        <a:latin typeface="+mn-lt"/>
+        <a:ea typeface="+mn-ea"/>
+        <a:cs typeface="+mn-cs"/>
+      </a:defRPr>
+    </a:lvl4pPr>
+    <a:lvl5pPr marL="362227" algn="l" defTabSz="181115" rtl="0" eaLnBrk="1" latinLnBrk="0" hangingPunct="1">
+      <a:defRPr sz="238" kern="1200">
+        <a:solidFill>
+          <a:schemeClr val="tx1"/>
+        </a:solidFill>
+        <a:latin typeface="+mn-lt"/>
+        <a:ea typeface="+mn-ea"/>
+        <a:cs typeface="+mn-cs"/>
+      </a:defRPr>
+    </a:lvl5pPr>
+    <a:lvl6pPr marL="452782" algn="l" defTabSz="181115" rtl="0" eaLnBrk="1" latinLnBrk="0" hangingPunct="1">
+      <a:defRPr sz="238" kern="1200">
+        <a:solidFill>
+          <a:schemeClr val="tx1"/>
+        </a:solidFill>
+        <a:latin typeface="+mn-lt"/>
+        <a:ea typeface="+mn-ea"/>
+        <a:cs typeface="+mn-cs"/>
+      </a:defRPr>
+    </a:lvl6pPr>
+    <a:lvl7pPr marL="543340" algn="l" defTabSz="181115" rtl="0" eaLnBrk="1" latinLnBrk="0" hangingPunct="1">
+      <a:defRPr sz="238" kern="1200">
+        <a:solidFill>
+          <a:schemeClr val="tx1"/>
+        </a:solidFill>
+        <a:latin typeface="+mn-lt"/>
+        <a:ea typeface="+mn-ea"/>
+        <a:cs typeface="+mn-cs"/>
+      </a:defRPr>
+    </a:lvl7pPr>
+    <a:lvl8pPr marL="633894" algn="l" defTabSz="181115" rtl="0" eaLnBrk="1" latinLnBrk="0" hangingPunct="1">
+      <a:defRPr sz="238" kern="1200">
+        <a:solidFill>
+          <a:schemeClr val="tx1"/>
+        </a:solidFill>
+        <a:latin typeface="+mn-lt"/>
+        <a:ea typeface="+mn-ea"/>
+        <a:cs typeface="+mn-cs"/>
+      </a:defRPr>
+    </a:lvl8pPr>
+    <a:lvl9pPr marL="724452" algn="l" defTabSz="181115" rtl="0" eaLnBrk="1" latinLnBrk="0" hangingPunct="1">
+      <a:defRPr sz="238" kern="1200">
+        <a:solidFill>
+          <a:schemeClr val="tx1"/>
+        </a:solidFill>
+        <a:latin typeface="+mn-lt"/>
+        <a:ea typeface="+mn-ea"/>
+        <a:cs typeface="+mn-cs"/>
+      </a:defRPr>
+    </a:lvl9pPr>
+  </p:notesStyle>
+</p:notesMaster>
+</file>
+
+<file path=ppt/slideLayouts/slideLayout1.xml><?xml version="1.0" encoding="utf-8"?>
+<p:sldLayout xmlns:a="http://schemas.openxmlformats.org/drawingml/2006/main" xmlns:r="http://schemas.openxmlformats.org/officeDocument/2006/relationships" xmlns:p="http://schemas.openxmlformats.org/presentationml/2006/main" showMasterSp="0" type="title" preserve="1">
+  <p:cSld name="Title Slide">
+    <p:spTree>
+      <p:nvGrpSpPr>
+        <p:cNvPr id="1" name=""/>
+        <p:cNvGrpSpPr/>
+        <p:nvPr/>
+      </p:nvGrpSpPr>
+      <p:grpSpPr>
+        <a:xfrm>
+          <a:off x="0" y="0"/>
+          <a:ext cx="0" cy="0"/>
+          <a:chOff x="0" y="0"/>
+          <a:chExt cx="0" cy="0"/>
+        </a:xfrm>
+      </p:grpSpPr>
+      <p:sp>
+        <p:nvSpPr>
+          <p:cNvPr id="8" name="Rectangle 7"/>
+          <p:cNvSpPr/>
+          <p:nvPr/>
+        </p:nvSpPr>
+        <p:spPr>
+          <a:xfrm>
+            <a:off x="2104549" y="0"/>
+            <a:ext cx="182880" cy="1527175"/>
           </a:xfrm>
           <a:prstGeom prst="rect">
             <a:avLst/>
           </a:prstGeom>
           <a:solidFill>
-            <a:schemeClr val="accent1"/>
+            <a:srgbClr val="303030"/>
           </a:solidFill>
           <a:ln>
             <a:noFill/>
@@ -288,29 +518,170 @@
       </p:sp>
       <p:sp>
         <p:nvSpPr>
-          <p:cNvPr id="8" name="Date Placeholder 7"/>
-          <p:cNvSpPr>
-            <a:spLocks noGrp="1"/>
-          </p:cNvSpPr>
-          <p:nvPr>
-            <p:ph type="dt" sz="half" idx="10"/>
-          </p:nvPr>
-        </p:nvSpPr>
-        <p:spPr/>
-        <p:txBody>
-          <a:bodyPr/>
+          <p:cNvPr id="2" name="Title 1"/>
+          <p:cNvSpPr>
+            <a:spLocks noGrp="1"/>
+          </p:cNvSpPr>
+          <p:nvPr>
+            <p:ph type="ctrTitle"/>
+          </p:nvPr>
+        </p:nvSpPr>
+        <p:spPr>
+          <a:xfrm>
+            <a:off x="236601" y="169007"/>
+            <a:ext cx="1765935" cy="900015"/>
+          </a:xfrm>
+        </p:spPr>
+        <p:txBody>
+          <a:bodyPr anchor="b">
+            <a:normAutofit/>
+          </a:bodyPr>
           <a:lstStyle>
-            <a:lvl1pPr>
-              <a:defRPr>
+            <a:lvl1pPr algn="l">
+              <a:lnSpc>
+                <a:spcPct val="85000"/>
+              </a:lnSpc>
+              <a:defRPr sz="1470" baseline="0">
                 <a:solidFill>
-                  <a:schemeClr val="bg2">
-                    <a:lumMod val="20000"/>
-                    <a:lumOff val="80000"/>
+                  <a:schemeClr val="tx1"/>
+                </a:solidFill>
+              </a:defRPr>
+            </a:lvl1pPr>
+          </a:lstStyle>
+          <a:p>
+            <a:r>
+              <a:rPr lang="en-US" smtClean="0"/>
+              <a:t>Click to edit Master title style</a:t>
+            </a:r>
+            <a:endParaRPr lang="en-US" dirty="0"/>
+          </a:p>
+        </p:txBody>
+      </p:sp>
+      <p:sp>
+        <p:nvSpPr>
+          <p:cNvPr id="3" name="Subtitle 2"/>
+          <p:cNvSpPr>
+            <a:spLocks noGrp="1"/>
+          </p:cNvSpPr>
+          <p:nvPr>
+            <p:ph type="subTitle" idx="1"/>
+          </p:nvPr>
+        </p:nvSpPr>
+        <p:spPr>
+          <a:xfrm>
+            <a:off x="236601" y="1069023"/>
+            <a:ext cx="1765935" cy="376703"/>
+          </a:xfrm>
+        </p:spPr>
+        <p:txBody>
+          <a:bodyPr>
+            <a:normAutofit/>
+          </a:bodyPr>
+          <a:lstStyle>
+            <a:lvl1pPr marL="0" indent="0" algn="l">
+              <a:buNone/>
+              <a:defRPr sz="445" baseline="0">
+                <a:solidFill>
+                  <a:schemeClr val="tx1">
+                    <a:lumMod val="65000"/>
                   </a:schemeClr>
                 </a:solidFill>
               </a:defRPr>
             </a:lvl1pPr>
+            <a:lvl2pPr marL="101818" indent="0" algn="ctr">
+              <a:buNone/>
+              <a:defRPr sz="445"/>
+            </a:lvl2pPr>
+            <a:lvl3pPr marL="203637" indent="0" algn="ctr">
+              <a:buNone/>
+              <a:defRPr sz="445"/>
+            </a:lvl3pPr>
+            <a:lvl4pPr marL="305455" indent="0" algn="ctr">
+              <a:buNone/>
+              <a:defRPr sz="445"/>
+            </a:lvl4pPr>
+            <a:lvl5pPr marL="407274" indent="0" algn="ctr">
+              <a:buNone/>
+              <a:defRPr sz="445"/>
+            </a:lvl5pPr>
+            <a:lvl6pPr marL="509092" indent="0" algn="ctr">
+              <a:buNone/>
+              <a:defRPr sz="445"/>
+            </a:lvl6pPr>
+            <a:lvl7pPr marL="610911" indent="0" algn="ctr">
+              <a:buNone/>
+              <a:defRPr sz="445"/>
+            </a:lvl7pPr>
+            <a:lvl8pPr marL="712729" indent="0" algn="ctr">
+              <a:buNone/>
+              <a:defRPr sz="445"/>
+            </a:lvl8pPr>
+            <a:lvl9pPr marL="814548" indent="0" algn="ctr">
+              <a:buNone/>
+              <a:defRPr sz="445"/>
+            </a:lvl9pPr>
           </a:lstStyle>
+          <a:p>
+            <a:r>
+              <a:rPr lang="en-US" smtClean="0"/>
+              <a:t>Click to edit Master subtitle style</a:t>
+            </a:r>
+            <a:endParaRPr lang="en-US" dirty="0"/>
+          </a:p>
+        </p:txBody>
+      </p:sp>
+      <p:sp>
+        <p:nvSpPr>
+          <p:cNvPr id="7" name="Rectangle 6"/>
+          <p:cNvSpPr/>
+          <p:nvPr/>
+        </p:nvSpPr>
+        <p:spPr>
+          <a:xfrm>
+            <a:off x="0" y="0"/>
+            <a:ext cx="85725" cy="1527175"/>
+          </a:xfrm>
+          <a:prstGeom prst="rect">
+            <a:avLst/>
+          </a:prstGeom>
+          <a:solidFill>
+            <a:srgbClr val="303030"/>
+          </a:solidFill>
+          <a:ln>
+            <a:noFill/>
+          </a:ln>
+        </p:spPr>
+        <p:style>
+          <a:lnRef idx="2">
+            <a:schemeClr val="accent1">
+              <a:shade val="50000"/>
+            </a:schemeClr>
+          </a:lnRef>
+          <a:fillRef idx="1">
+            <a:schemeClr val="accent1"/>
+          </a:fillRef>
+          <a:effectRef idx="0">
+            <a:schemeClr val="accent1"/>
+          </a:effectRef>
+          <a:fontRef idx="minor">
+            <a:schemeClr val="lt1"/>
+          </a:fontRef>
+        </p:style>
+      </p:sp>
+      <p:sp>
+        <p:nvSpPr>
+          <p:cNvPr id="4" name="Date Placeholder 3"/>
+          <p:cNvSpPr>
+            <a:spLocks noGrp="1"/>
+          </p:cNvSpPr>
+          <p:nvPr>
+            <p:ph type="dt" sz="half" idx="10"/>
+          </p:nvPr>
+        </p:nvSpPr>
+        <p:spPr/>
+        <p:txBody>
+          <a:bodyPr/>
+          <a:lstStyle/>
           <a:p>
             <a:fld id="{2531F414-B448-EF4F-B42B-0FFE35C0B6B6}" type="datetimeFigureOut">
               <a:rPr lang="en-US" smtClean="0"/>
@@ -322,7 +693,7 @@
       </p:sp>
       <p:sp>
         <p:nvSpPr>
-          <p:cNvPr id="9" name="Footer Placeholder 8"/>
+          <p:cNvPr id="5" name="Footer Placeholder 4"/>
           <p:cNvSpPr>
             <a:spLocks noGrp="1"/>
           </p:cNvSpPr>
@@ -333,18 +704,7 @@
         <p:spPr/>
         <p:txBody>
           <a:bodyPr/>
-          <a:lstStyle>
-            <a:lvl1pPr>
-              <a:defRPr>
-                <a:solidFill>
-                  <a:schemeClr val="bg2">
-                    <a:lumMod val="20000"/>
-                    <a:lumOff val="80000"/>
-                  </a:schemeClr>
-                </a:solidFill>
-              </a:defRPr>
-            </a:lvl1pPr>
-          </a:lstStyle>
+          <a:lstStyle/>
           <a:p>
             <a:endParaRPr lang="en-US"/>
           </a:p>
@@ -352,7 +712,7 @@
       </p:sp>
       <p:sp>
         <p:nvSpPr>
-          <p:cNvPr id="10" name="Slide Number Placeholder 9"/>
+          <p:cNvPr id="6" name="Slide Number Placeholder 5"/>
           <p:cNvSpPr>
             <a:spLocks noGrp="1"/>
           </p:cNvSpPr>
@@ -363,18 +723,7 @@
         <p:spPr/>
         <p:txBody>
           <a:bodyPr/>
-          <a:lstStyle>
-            <a:lvl1pPr>
-              <a:defRPr>
-                <a:solidFill>
-                  <a:schemeClr val="bg2">
-                    <a:lumMod val="60000"/>
-                    <a:lumOff val="40000"/>
-                  </a:schemeClr>
-                </a:solidFill>
-              </a:defRPr>
-            </a:lvl1pPr>
-          </a:lstStyle>
+          <a:lstStyle/>
           <a:p>
             <a:fld id="{37FA0A92-CA34-7241-B174-D8496DA8CEB1}" type="slidenum">
               <a:rPr lang="en-US" smtClean="0"/>
@@ -387,8 +736,13 @@
     </p:spTree>
   </p:cSld>
   <p:clrMapOvr>
-    <a:overrideClrMapping bg1="dk1" tx1="lt1" bg2="dk2" tx2="lt2" accent1="accent1" accent2="accent2" accent3="accent3" accent4="accent4" accent5="accent5" accent6="accent6" hlink="hlink" folHlink="folHlink"/>
+    <a:masterClrMapping/>
   </p:clrMapOvr>
+  <p:extLst>
+    <p:ext uri="{DCECCB84-F9BA-43D5-87BE-67443E8EF086}">
+      <p15:sldGuideLst xmlns:p15="http://schemas.microsoft.com/office/powerpoint/2012/main"/>
+    </p:ext>
+  </p:extLst>
 </p:sldLayout>
 </file>
 
@@ -729,6 +1083,11 @@
   <p:clrMapOvr>
     <a:masterClrMapping/>
   </p:clrMapOvr>
+  <p:extLst>
+    <p:ext uri="{DCECCB84-F9BA-43D5-87BE-67443E8EF086}">
+      <p15:sldGuideLst xmlns:p15="http://schemas.microsoft.com/office/powerpoint/2012/main"/>
+    </p:ext>
+  </p:extLst>
 </p:sldLayout>
 </file>
 
@@ -977,8 +1336,7 @@
               <a:defRPr sz="445">
                 <a:solidFill>
                   <a:schemeClr val="tx1">
-                    <a:lumMod val="75000"/>
-                    <a:lumOff val="25000"/>
+                    <a:lumMod val="65000"/>
                   </a:schemeClr>
                 </a:solidFill>
               </a:defRPr>
@@ -1153,7 +1511,7 @@
             <a:avLst/>
           </a:prstGeom>
           <a:solidFill>
-            <a:schemeClr val="accent1"/>
+            <a:srgbClr val="303030"/>
           </a:solidFill>
           <a:ln>
             <a:noFill/>
@@ -1181,6 +1539,11 @@
   <p:clrMapOvr>
     <a:masterClrMapping/>
   </p:clrMapOvr>
+  <p:extLst>
+    <p:ext uri="{DCECCB84-F9BA-43D5-87BE-67443E8EF086}">
+      <p15:sldGuideLst xmlns:p15="http://schemas.microsoft.com/office/powerpoint/2012/main"/>
+    </p:ext>
+  </p:extLst>
 </p:sldLayout>
 </file>
 
@@ -1464,6 +1827,11 @@
   <p:clrMapOvr>
     <a:masterClrMapping/>
   </p:clrMapOvr>
+  <p:extLst>
+    <p:ext uri="{DCECCB84-F9BA-43D5-87BE-67443E8EF086}">
+      <p15:sldGuideLst xmlns:p15="http://schemas.microsoft.com/office/powerpoint/2012/main"/>
+    </p:ext>
+  </p:extLst>
 </p:sldLayout>
 </file>
 
@@ -1535,7 +1903,9 @@
               <a:buNone/>
               <a:defRPr sz="401" b="0">
                 <a:solidFill>
-                  <a:schemeClr val="tx2"/>
+                  <a:schemeClr val="tx1">
+                    <a:lumMod val="65000"/>
+                  </a:schemeClr>
                 </a:solidFill>
               </a:defRPr>
             </a:lvl1pPr>
@@ -1688,35 +2058,22 @@
           </a:bodyPr>
           <a:lstStyle>
             <a:lvl1pPr marL="0" indent="0">
+              <a:spcBef>
+                <a:spcPts val="0"/>
+              </a:spcBef>
               <a:buFontTx/>
               <a:buNone/>
-              <a:defRPr lang="en-US" sz="401" b="0" kern="1200" spc="2" baseline="0" dirty="0">
+              <a:defRPr sz="401">
                 <a:solidFill>
-                  <a:schemeClr val="tx2"/>
+                  <a:schemeClr val="tx1">
+                    <a:lumMod val="65000"/>
+                  </a:schemeClr>
                 </a:solidFill>
-                <a:latin typeface="+mn-lt"/>
-                <a:ea typeface="+mn-ea"/>
-                <a:cs typeface="+mn-cs"/>
               </a:defRPr>
             </a:lvl1pPr>
           </a:lstStyle>
           <a:p>
-            <a:pPr marL="0" lvl="0" indent="0" algn="l" defTabSz="203637" rtl="0" eaLnBrk="1" latinLnBrk="0" hangingPunct="1">
-              <a:lnSpc>
-                <a:spcPct val="95000"/>
-              </a:lnSpc>
-              <a:spcBef>
-                <a:spcPts val="0"/>
-              </a:spcBef>
-              <a:spcAft>
-                <a:spcPts val="45"/>
-              </a:spcAft>
-              <a:buClr>
-                <a:schemeClr val="accent1"/>
-              </a:buClr>
-              <a:buSzPct val="80000"/>
-              <a:buNone/>
-            </a:pPr>
+            <a:pPr lvl="0"/>
             <a:r>
               <a:rPr lang="en-US" smtClean="0"/>
               <a:t>Click to edit Master text styles</a:t>
@@ -1879,6 +2236,11 @@
   <p:clrMapOvr>
     <a:masterClrMapping/>
   </p:clrMapOvr>
+  <p:extLst>
+    <p:ext uri="{DCECCB84-F9BA-43D5-87BE-67443E8EF086}">
+      <p15:sldGuideLst xmlns:p15="http://schemas.microsoft.com/office/powerpoint/2012/main"/>
+    </p:ext>
+  </p:extLst>
 </p:sldLayout>
 </file>
 
@@ -2364,6 +2726,11 @@
   <p:clrMapOvr>
     <a:masterClrMapping/>
   </p:clrMapOvr>
+  <p:extLst>
+    <p:ext uri="{DCECCB84-F9BA-43D5-87BE-67443E8EF086}">
+      <p15:sldGuideLst xmlns:p15="http://schemas.microsoft.com/office/powerpoint/2012/main"/>
+    </p:ext>
+  </p:extLst>
 </p:sldLayout>
 </file>
 
@@ -2446,7 +2813,7 @@
             <a:lvl1pPr>
               <a:defRPr sz="624" b="0">
                 <a:solidFill>
-                  <a:schemeClr val="bg1"/>
+                  <a:schemeClr val="tx1"/>
                 </a:solidFill>
               </a:defRPr>
             </a:lvl1pPr>
@@ -2475,20 +2842,13 @@
             <a:off x="0" y="0"/>
             <a:ext cx="2117408" cy="1142135"/>
           </a:xfrm>
-          <a:solidFill>
-            <a:schemeClr val="accent1"/>
-          </a:solidFill>
         </p:spPr>
         <p:txBody>
           <a:bodyPr anchor="t"/>
           <a:lstStyle>
             <a:lvl1pPr marL="0" indent="0">
               <a:buNone/>
-              <a:defRPr sz="713">
-                <a:solidFill>
-                  <a:schemeClr val="bg1"/>
-                </a:solidFill>
-              </a:defRPr>
+              <a:defRPr sz="713"/>
             </a:lvl1pPr>
             <a:lvl2pPr marL="101818" indent="0">
               <a:buNone/>
@@ -2563,8 +2923,8 @@
               <a:buNone/>
               <a:defRPr sz="290">
                 <a:solidFill>
-                  <a:schemeClr val="bg1">
-                    <a:lumMod val="85000"/>
+                  <a:schemeClr val="tx1">
+                    <a:lumMod val="75000"/>
                   </a:schemeClr>
                 </a:solidFill>
               </a:defRPr>
@@ -2721,9 +3081,7 @@
             <a:avLst/>
           </a:prstGeom>
           <a:solidFill>
-            <a:schemeClr val="tx2">
-              <a:lumMod val="75000"/>
-            </a:schemeClr>
+            <a:srgbClr val="303030"/>
           </a:solidFill>
           <a:ln>
             <a:noFill/>
@@ -2866,10 +3224,7 @@
             <a:lvl1pPr algn="r">
               <a:defRPr sz="234" b="0">
                 <a:solidFill>
-                  <a:schemeClr val="tx2">
-                    <a:lumMod val="20000"/>
-                    <a:lumOff val="80000"/>
-                  </a:schemeClr>
+                  <a:srgbClr val="969696"/>
                 </a:solidFill>
               </a:defRPr>
             </a:lvl1pPr>
@@ -2908,9 +3263,8 @@
             <a:lvl1pPr algn="l">
               <a:defRPr sz="234">
                 <a:solidFill>
-                  <a:schemeClr val="tx2">
-                    <a:lumMod val="20000"/>
-                    <a:lumOff val="80000"/>
+                  <a:schemeClr val="tx1">
+                    <a:lumMod val="65000"/>
                   </a:schemeClr>
                 </a:solidFill>
               </a:defRPr>
@@ -2948,10 +3302,7 @@
             <a:lvl1pPr algn="ctr">
               <a:defRPr sz="713">
                 <a:solidFill>
-                  <a:schemeClr val="tx2">
-                    <a:lumMod val="60000"/>
-                    <a:lumOff val="40000"/>
-                  </a:schemeClr>
+                  <a:srgbClr val="777777"/>
                 </a:solidFill>
               </a:defRPr>
             </a:lvl1pPr>
@@ -2968,23 +3319,23 @@
     </p:spTree>
     <p:extLst>
       <p:ext uri="{BB962C8B-B14F-4D97-AF65-F5344CB8AC3E}">
-        <p14:creationId xmlns:p14="http://schemas.microsoft.com/office/powerpoint/2010/main" val="439938597"/>
+        <p14:creationId xmlns:p14="http://schemas.microsoft.com/office/powerpoint/2010/main" val="378334181"/>
       </p:ext>
     </p:extLst>
   </p:cSld>
-  <p:clrMap bg1="lt1" tx1="dk1" bg2="lt2" tx2="dk2" accent1="accent1" accent2="accent2" accent3="accent3" accent4="accent4" accent5="accent5" accent6="accent6" hlink="hlink" folHlink="folHlink"/>
+  <p:clrMap bg1="dk1" tx1="lt1" bg2="dk2" tx2="lt2" accent1="accent1" accent2="accent2" accent3="accent3" accent4="accent4" accent5="accent5" accent6="accent6" hlink="hlink" folHlink="folHlink"/>
   <p:sldLayoutIdLst>
-    <p:sldLayoutId id="2147483973" r:id="rId1"/>
-    <p:sldLayoutId id="2147483974" r:id="rId2"/>
-    <p:sldLayoutId id="2147483975" r:id="rId3"/>
-    <p:sldLayoutId id="2147483976" r:id="rId4"/>
-    <p:sldLayoutId id="2147483977" r:id="rId5"/>
-    <p:sldLayoutId id="2147483978" r:id="rId6"/>
-    <p:sldLayoutId id="2147483979" r:id="rId7"/>
-    <p:sldLayoutId id="2147483980" r:id="rId8"/>
-    <p:sldLayoutId id="2147483981" r:id="rId9"/>
-    <p:sldLayoutId id="2147483982" r:id="rId10"/>
-    <p:sldLayoutId id="2147483983" r:id="rId11"/>
+    <p:sldLayoutId id="2147484309" r:id="rId1"/>
+    <p:sldLayoutId id="2147484310" r:id="rId2"/>
+    <p:sldLayoutId id="2147484311" r:id="rId3"/>
+    <p:sldLayoutId id="2147484312" r:id="rId4"/>
+    <p:sldLayoutId id="2147484313" r:id="rId5"/>
+    <p:sldLayoutId id="2147484314" r:id="rId6"/>
+    <p:sldLayoutId id="2147484315" r:id="rId7"/>
+    <p:sldLayoutId id="2147484316" r:id="rId8"/>
+    <p:sldLayoutId id="2147484317" r:id="rId9"/>
+    <p:sldLayoutId id="2147484318" r:id="rId10"/>
+    <p:sldLayoutId id="2147484319" r:id="rId11"/>
   </p:sldLayoutIdLst>
   <p:txStyles>
     <p:titleStyle>
@@ -3345,6 +3696,11 @@
       </a:lvl9pPr>
     </p:otherStyle>
   </p:txStyles>
+  <p:extLst>
+    <p:ext uri="{27BBF7A9-308A-43DC-89C8-2F10F3537804}">
+      <p15:sldGuideLst xmlns:p15="http://schemas.microsoft.com/office/powerpoint/2012/main"/>
+    </p:ext>
+  </p:extLst>
 </p:sldMaster>
 </file>
 
@@ -3481,45 +3837,189 @@
 </p:sld>
 </file>
 
+<file path=ppt/slides/slide2.xml><?xml version="1.0" encoding="utf-8"?>
+<p:sld xmlns:a="http://schemas.openxmlformats.org/drawingml/2006/main" xmlns:r="http://schemas.openxmlformats.org/officeDocument/2006/relationships" xmlns:p="http://schemas.openxmlformats.org/presentationml/2006/main">
+  <p:cSld>
+    <p:spTree>
+      <p:nvGrpSpPr>
+        <p:cNvPr id="1" name=""/>
+        <p:cNvGrpSpPr/>
+        <p:nvPr/>
+      </p:nvGrpSpPr>
+      <p:grpSpPr>
+        <a:xfrm>
+          <a:off x="0" y="0"/>
+          <a:ext cx="0" cy="0"/>
+          <a:chOff x="0" y="0"/>
+          <a:chExt cx="0" cy="0"/>
+        </a:xfrm>
+      </p:grpSpPr>
+      <p:sp>
+        <p:nvSpPr>
+          <p:cNvPr id="2" name="Title 1"/>
+          <p:cNvSpPr>
+            <a:spLocks noGrp="1"/>
+          </p:cNvSpPr>
+          <p:nvPr>
+            <p:ph type="ctrTitle"/>
+          </p:nvPr>
+        </p:nvSpPr>
+        <p:spPr>
+          <a:xfrm>
+            <a:off x="151264" y="39240"/>
+            <a:ext cx="2056649" cy="425697"/>
+          </a:xfrm>
+        </p:spPr>
+        <p:txBody>
+          <a:bodyPr>
+            <a:normAutofit/>
+          </a:bodyPr>
+          <a:lstStyle/>
+          <a:p>
+            <a:pPr algn="ctr"/>
+            <a:r>
+              <a:rPr lang="en-US" dirty="0" smtClean="0"/>
+              <a:t>Tap Tempo</a:t>
+            </a:r>
+            <a:endParaRPr lang="en-US" dirty="0"/>
+          </a:p>
+        </p:txBody>
+      </p:sp>
+      <p:pic>
+        <p:nvPicPr>
+          <p:cNvPr id="8" name="Picture 7"/>
+          <p:cNvPicPr>
+            <a:picLocks noChangeAspect="1"/>
+          </p:cNvPicPr>
+          <p:nvPr/>
+        </p:nvPicPr>
+        <p:blipFill>
+          <a:blip r:embed="rId2">
+            <a:extLst>
+              <a:ext uri="{28A0092B-C50C-407E-A947-70E740481C1C}">
+                <a14:useLocalDpi xmlns:a14="http://schemas.microsoft.com/office/drawing/2010/main" val="0"/>
+              </a:ext>
+            </a:extLst>
+          </a:blip>
+          <a:stretch>
+            <a:fillRect/>
+          </a:stretch>
+        </p:blipFill>
+        <p:spPr>
+          <a:xfrm>
+            <a:off x="457201" y="615950"/>
+            <a:ext cx="546100" cy="546100"/>
+          </a:xfrm>
+          <a:prstGeom prst="rect">
+            <a:avLst/>
+          </a:prstGeom>
+        </p:spPr>
+      </p:pic>
+      <p:sp>
+        <p:nvSpPr>
+          <p:cNvPr id="9" name="Rectangle 8"/>
+          <p:cNvSpPr/>
+          <p:nvPr/>
+        </p:nvSpPr>
+        <p:spPr>
+          <a:xfrm>
+            <a:off x="1244600" y="771525"/>
+            <a:ext cx="428625" cy="234950"/>
+          </a:xfrm>
+          <a:prstGeom prst="rect">
+            <a:avLst/>
+          </a:prstGeom>
+          <a:solidFill>
+            <a:schemeClr val="bg1">
+              <a:lumMod val="65000"/>
+              <a:lumOff val="35000"/>
+            </a:schemeClr>
+          </a:solidFill>
+        </p:spPr>
+        <p:style>
+          <a:lnRef idx="2">
+            <a:schemeClr val="accent1">
+              <a:shade val="50000"/>
+            </a:schemeClr>
+          </a:lnRef>
+          <a:fillRef idx="1">
+            <a:schemeClr val="accent1"/>
+          </a:fillRef>
+          <a:effectRef idx="0">
+            <a:schemeClr val="accent1"/>
+          </a:effectRef>
+          <a:fontRef idx="minor">
+            <a:schemeClr val="lt1"/>
+          </a:fontRef>
+        </p:style>
+        <p:txBody>
+          <a:bodyPr rtlCol="0" anchor="ctr"/>
+          <a:lstStyle/>
+          <a:p>
+            <a:pPr algn="ctr"/>
+            <a:endParaRPr lang="en-US"/>
+          </a:p>
+        </p:txBody>
+      </p:sp>
+    </p:spTree>
+    <p:extLst>
+      <p:ext uri="{BB962C8B-B14F-4D97-AF65-F5344CB8AC3E}">
+        <p14:creationId xmlns:p14="http://schemas.microsoft.com/office/powerpoint/2010/main" val="383533002"/>
+      </p:ext>
+    </p:extLst>
+  </p:cSld>
+  <p:clrMapOvr>
+    <a:masterClrMapping/>
+  </p:clrMapOvr>
+  <p:timing>
+    <p:tnLst>
+      <p:par>
+        <p:cTn id="1" dur="indefinite" restart="never" nodeType="tmRoot"/>
+      </p:par>
+    </p:tnLst>
+  </p:timing>
+</p:sld>
+</file>
+
 <file path=ppt/theme/theme1.xml><?xml version="1.0" encoding="utf-8"?>
 <a:theme xmlns:a="http://schemas.openxmlformats.org/drawingml/2006/main" name="View">
   <a:themeElements>
     <a:clrScheme name="View">
       <a:dk1>
-        <a:srgbClr val="000000"/>
+        <a:sysClr val="windowText" lastClr="000000"/>
       </a:dk1>
       <a:lt1>
-        <a:srgbClr val="FFFFFF"/>
+        <a:sysClr val="window" lastClr="FFFFFF"/>
       </a:lt1>
       <a:dk2>
-        <a:srgbClr val="46464A"/>
+        <a:srgbClr val="564B3C"/>
       </a:dk2>
       <a:lt2>
-        <a:srgbClr val="D6D3CC"/>
+        <a:srgbClr val="ECEDD1"/>
       </a:lt2>
       <a:accent1>
-        <a:srgbClr val="6F6F74"/>
+        <a:srgbClr val="93A299"/>
       </a:accent1>
       <a:accent2>
-        <a:srgbClr val="92A9B9"/>
+        <a:srgbClr val="CB4B30"/>
       </a:accent2>
       <a:accent3>
-        <a:srgbClr val="A7B789"/>
+        <a:srgbClr val="B5AE53"/>
       </a:accent3>
       <a:accent4>
-        <a:srgbClr val="B9A489"/>
+        <a:srgbClr val="6F6A7A"/>
       </a:accent4>
       <a:accent5>
-        <a:srgbClr val="8D6374"/>
+        <a:srgbClr val="E8B54D"/>
       </a:accent5>
       <a:accent6>
-        <a:srgbClr val="9B7362"/>
+        <a:srgbClr val="8A7952"/>
       </a:accent6>
       <a:hlink>
-        <a:srgbClr val="67AABF"/>
+        <a:srgbClr val="9F9F0B"/>
       </a:hlink>
       <a:folHlink>
-        <a:srgbClr val="ABAFA5"/>
+        <a:srgbClr val="B2B2B2"/>
       </a:folHlink>
     </a:clrScheme>
     <a:fontScheme name="View">
@@ -3608,7 +4108,7 @@
         <a:solidFill>
           <a:schemeClr val="phClr">
             <a:shade val="75000"/>
-            <a:satMod val="160000"/>
+            <a:satMod val="130000"/>
           </a:schemeClr>
         </a:solidFill>
       </a:fillStyleLst>
@@ -3682,7 +4182,7 @@
             <a:bevelT w="0" h="0" prst="coolSlant"/>
             <a:contourClr>
               <a:schemeClr val="phClr">
-                <a:shade val="25000"/>
+                <a:shade val="35000"/>
                 <a:satMod val="140000"/>
               </a:schemeClr>
             </a:contourClr>
@@ -3728,7 +4228,268 @@
   <a:extraClrSchemeLst/>
   <a:extLst>
     <a:ext uri="{05A4C25C-085E-4340-85A3-A5531E510DB2}">
-      <thm15:themeFamily xmlns:thm15="http://schemas.microsoft.com/office/thememl/2012/main" name="View" id="{BA0EB5A6-F2D4-4F82-977B-64ADEE4A2A69}" vid="{3969A8A2-35DB-4E3B-8885-16FD20568674}"/>
+      <thm15:themeFamily xmlns:thm15="http://schemas.microsoft.com/office/thememl/2012/main" name="View" id="{BA0EB5A6-F2D4-4F82-977B-64ADEE4A2A69}" vid="{3866257B-E5CE-4C43-9210-F2DE76BE10B5}"/>
+    </a:ext>
+  </a:extLst>
+</a:theme>
+</file>
+
+<file path=ppt/theme/theme2.xml><?xml version="1.0" encoding="utf-8"?>
+<a:theme xmlns:a="http://schemas.openxmlformats.org/drawingml/2006/main" name="Office Theme">
+  <a:themeElements>
+    <a:clrScheme name="Office">
+      <a:dk1>
+        <a:sysClr val="windowText" lastClr="000000"/>
+      </a:dk1>
+      <a:lt1>
+        <a:sysClr val="window" lastClr="FFFFFF"/>
+      </a:lt1>
+      <a:dk2>
+        <a:srgbClr val="44546A"/>
+      </a:dk2>
+      <a:lt2>
+        <a:srgbClr val="E7E6E6"/>
+      </a:lt2>
+      <a:accent1>
+        <a:srgbClr val="4472C4"/>
+      </a:accent1>
+      <a:accent2>
+        <a:srgbClr val="ED7D31"/>
+      </a:accent2>
+      <a:accent3>
+        <a:srgbClr val="A5A5A5"/>
+      </a:accent3>
+      <a:accent4>
+        <a:srgbClr val="FFC000"/>
+      </a:accent4>
+      <a:accent5>
+        <a:srgbClr val="5B9BD5"/>
+      </a:accent5>
+      <a:accent6>
+        <a:srgbClr val="70AD47"/>
+      </a:accent6>
+      <a:hlink>
+        <a:srgbClr val="0563C1"/>
+      </a:hlink>
+      <a:folHlink>
+        <a:srgbClr val="954F72"/>
+      </a:folHlink>
+    </a:clrScheme>
+    <a:fontScheme name="Office">
+      <a:majorFont>
+        <a:latin typeface="Calibri Light" panose="020F0302020204030204"/>
+        <a:ea typeface=""/>
+        <a:cs typeface=""/>
+        <a:font script="Jpan" typeface="Yu Gothic Light"/>
+        <a:font script="Hang" typeface="맑은 고딕"/>
+        <a:font script="Hans" typeface="DengXian Light"/>
+        <a:font script="Hant" typeface="新細明體"/>
+        <a:font script="Arab" typeface="Times New Roman"/>
+        <a:font script="Hebr" typeface="Times New Roman"/>
+        <a:font script="Thai" typeface="Angsana New"/>
+        <a:font script="Ethi" typeface="Nyala"/>
+        <a:font script="Beng" typeface="Vrinda"/>
+        <a:font script="Gujr" typeface="Shruti"/>
+        <a:font script="Khmr" typeface="MoolBoran"/>
+        <a:font script="Knda" typeface="Tunga"/>
+        <a:font script="Guru" typeface="Raavi"/>
+        <a:font script="Cans" typeface="Euphemia"/>
+        <a:font script="Cher" typeface="Plantagenet Cherokee"/>
+        <a:font script="Yiii" typeface="Microsoft Yi Baiti"/>
+        <a:font script="Tibt" typeface="Microsoft Himalaya"/>
+        <a:font script="Thaa" typeface="MV Boli"/>
+        <a:font script="Deva" typeface="Mangal"/>
+        <a:font script="Telu" typeface="Gautami"/>
+        <a:font script="Taml" typeface="Latha"/>
+        <a:font script="Syrc" typeface="Estrangelo Edessa"/>
+        <a:font script="Orya" typeface="Kalinga"/>
+        <a:font script="Mlym" typeface="Kartika"/>
+        <a:font script="Laoo" typeface="DokChampa"/>
+        <a:font script="Sinh" typeface="Iskoola Pota"/>
+        <a:font script="Mong" typeface="Mongolian Baiti"/>
+        <a:font script="Viet" typeface="Times New Roman"/>
+        <a:font script="Uigh" typeface="Microsoft Uighur"/>
+        <a:font script="Geor" typeface="Sylfaen"/>
+      </a:majorFont>
+      <a:minorFont>
+        <a:latin typeface="Calibri" panose="020F0502020204030204"/>
+        <a:ea typeface=""/>
+        <a:cs typeface=""/>
+        <a:font script="Jpan" typeface="Yu Gothic"/>
+        <a:font script="Hang" typeface="맑은 고딕"/>
+        <a:font script="Hans" typeface="DengXian"/>
+        <a:font script="Hant" typeface="新細明體"/>
+        <a:font script="Arab" typeface="Arial"/>
+        <a:font script="Hebr" typeface="Arial"/>
+        <a:font script="Thai" typeface="Cordia New"/>
+        <a:font script="Ethi" typeface="Nyala"/>
+        <a:font script="Beng" typeface="Vrinda"/>
+        <a:font script="Gujr" typeface="Shruti"/>
+        <a:font script="Khmr" typeface="DaunPenh"/>
+        <a:font script="Knda" typeface="Tunga"/>
+        <a:font script="Guru" typeface="Raavi"/>
+        <a:font script="Cans" typeface="Euphemia"/>
+        <a:font script="Cher" typeface="Plantagenet Cherokee"/>
+        <a:font script="Yiii" typeface="Microsoft Yi Baiti"/>
+        <a:font script="Tibt" typeface="Microsoft Himalaya"/>
+        <a:font script="Thaa" typeface="MV Boli"/>
+        <a:font script="Deva" typeface="Mangal"/>
+        <a:font script="Telu" typeface="Gautami"/>
+        <a:font script="Taml" typeface="Latha"/>
+        <a:font script="Syrc" typeface="Estrangelo Edessa"/>
+        <a:font script="Orya" typeface="Kalinga"/>
+        <a:font script="Mlym" typeface="Kartika"/>
+        <a:font script="Laoo" typeface="DokChampa"/>
+        <a:font script="Sinh" typeface="Iskoola Pota"/>
+        <a:font script="Mong" typeface="Mongolian Baiti"/>
+        <a:font script="Viet" typeface="Arial"/>
+        <a:font script="Uigh" typeface="Microsoft Uighur"/>
+        <a:font script="Geor" typeface="Sylfaen"/>
+      </a:minorFont>
+    </a:fontScheme>
+    <a:fmtScheme name="Office">
+      <a:fillStyleLst>
+        <a:solidFill>
+          <a:schemeClr val="phClr"/>
+        </a:solidFill>
+        <a:gradFill rotWithShape="1">
+          <a:gsLst>
+            <a:gs pos="0">
+              <a:schemeClr val="phClr">
+                <a:lumMod val="110000"/>
+                <a:satMod val="105000"/>
+                <a:tint val="67000"/>
+              </a:schemeClr>
+            </a:gs>
+            <a:gs pos="50000">
+              <a:schemeClr val="phClr">
+                <a:lumMod val="105000"/>
+                <a:satMod val="103000"/>
+                <a:tint val="73000"/>
+              </a:schemeClr>
+            </a:gs>
+            <a:gs pos="100000">
+              <a:schemeClr val="phClr">
+                <a:lumMod val="105000"/>
+                <a:satMod val="109000"/>
+                <a:tint val="81000"/>
+              </a:schemeClr>
+            </a:gs>
+          </a:gsLst>
+          <a:lin ang="5400000" scaled="0"/>
+        </a:gradFill>
+        <a:gradFill rotWithShape="1">
+          <a:gsLst>
+            <a:gs pos="0">
+              <a:schemeClr val="phClr">
+                <a:satMod val="103000"/>
+                <a:lumMod val="102000"/>
+                <a:tint val="94000"/>
+              </a:schemeClr>
+            </a:gs>
+            <a:gs pos="50000">
+              <a:schemeClr val="phClr">
+                <a:satMod val="110000"/>
+                <a:lumMod val="100000"/>
+                <a:shade val="100000"/>
+              </a:schemeClr>
+            </a:gs>
+            <a:gs pos="100000">
+              <a:schemeClr val="phClr">
+                <a:lumMod val="99000"/>
+                <a:satMod val="120000"/>
+                <a:shade val="78000"/>
+              </a:schemeClr>
+            </a:gs>
+          </a:gsLst>
+          <a:lin ang="5400000" scaled="0"/>
+        </a:gradFill>
+      </a:fillStyleLst>
+      <a:lnStyleLst>
+        <a:ln w="6350" cap="flat" cmpd="sng" algn="ctr">
+          <a:solidFill>
+            <a:schemeClr val="phClr"/>
+          </a:solidFill>
+          <a:prstDash val="solid"/>
+          <a:miter lim="800000"/>
+        </a:ln>
+        <a:ln w="12700" cap="flat" cmpd="sng" algn="ctr">
+          <a:solidFill>
+            <a:schemeClr val="phClr"/>
+          </a:solidFill>
+          <a:prstDash val="solid"/>
+          <a:miter lim="800000"/>
+        </a:ln>
+        <a:ln w="19050" cap="flat" cmpd="sng" algn="ctr">
+          <a:solidFill>
+            <a:schemeClr val="phClr"/>
+          </a:solidFill>
+          <a:prstDash val="solid"/>
+          <a:miter lim="800000"/>
+        </a:ln>
+      </a:lnStyleLst>
+      <a:effectStyleLst>
+        <a:effectStyle>
+          <a:effectLst/>
+        </a:effectStyle>
+        <a:effectStyle>
+          <a:effectLst/>
+        </a:effectStyle>
+        <a:effectStyle>
+          <a:effectLst>
+            <a:outerShdw blurRad="57150" dist="19050" dir="5400000" algn="ctr" rotWithShape="0">
+              <a:srgbClr val="000000">
+                <a:alpha val="63000"/>
+              </a:srgbClr>
+            </a:outerShdw>
+          </a:effectLst>
+        </a:effectStyle>
+      </a:effectStyleLst>
+      <a:bgFillStyleLst>
+        <a:solidFill>
+          <a:schemeClr val="phClr"/>
+        </a:solidFill>
+        <a:solidFill>
+          <a:schemeClr val="phClr">
+            <a:tint val="95000"/>
+            <a:satMod val="170000"/>
+          </a:schemeClr>
+        </a:solidFill>
+        <a:gradFill rotWithShape="1">
+          <a:gsLst>
+            <a:gs pos="0">
+              <a:schemeClr val="phClr">
+                <a:tint val="93000"/>
+                <a:satMod val="150000"/>
+                <a:shade val="98000"/>
+                <a:lumMod val="102000"/>
+              </a:schemeClr>
+            </a:gs>
+            <a:gs pos="50000">
+              <a:schemeClr val="phClr">
+                <a:tint val="98000"/>
+                <a:satMod val="130000"/>
+                <a:shade val="90000"/>
+                <a:lumMod val="103000"/>
+              </a:schemeClr>
+            </a:gs>
+            <a:gs pos="100000">
+              <a:schemeClr val="phClr">
+                <a:shade val="63000"/>
+                <a:satMod val="120000"/>
+              </a:schemeClr>
+            </a:gs>
+          </a:gsLst>
+          <a:lin ang="5400000" scaled="0"/>
+        </a:gradFill>
+      </a:bgFillStyleLst>
+    </a:fmtScheme>
+  </a:themeElements>
+  <a:objectDefaults/>
+  <a:extraClrSchemeLst/>
+  <a:extLst>
+    <a:ext uri="{05A4C25C-085E-4340-85A3-A5531E510DB2}">
+      <thm15:themeFamily xmlns:thm15="http://schemas.microsoft.com/office/thememl/2012/main" name="Office Theme" id="{62F939B6-93AF-4DB8-9C6B-D6C7DFDC589F}" vid="{4A3C46E8-61CC-4603-A589-7422A47A8E4A}"/>
     </a:ext>
   </a:extLst>
 </a:theme>

</xml_diff>